<commit_message>
updated thumbnail of 4-th lecture
</commit_message>
<xml_diff>
--- a/lectures/lecture #4 presentation.pptx
+++ b/lectures/lecture #4 presentation.pptx
@@ -204,7 +204,7 @@
           <a:p>
             <a:fld id="{9F16E362-832A-824E-B063-25F5DE831740}" type="datetimeFigureOut">
               <a:rPr lang="en-RU" smtClean="0"/>
-              <a:t>12.11.2021</a:t>
+              <a:t>18.12.2021</a:t>
             </a:fld>
             <a:endParaRPr lang="en-RU"/>
           </a:p>
@@ -2328,7 +2328,7 @@
               <a:rPr lang="en-US" sz="4800" dirty="0">
                 <a:latin typeface="Helvetica" pitchFamily="2" charset="0"/>
               </a:rPr>
-              <a:t>Practice</a:t>
+              <a:t>Practice, pt.1</a:t>
             </a:r>
             <a:endParaRPr lang="en-US" sz="4800" dirty="0">
               <a:solidFill>
@@ -5421,7 +5421,7 @@
               <a:rPr lang="en-US" sz="4800" dirty="0">
                 <a:latin typeface="Helvetica" pitchFamily="2" charset="0"/>
               </a:rPr>
-              <a:t>Practice</a:t>
+              <a:t>Practice, pt.1</a:t>
             </a:r>
             <a:endParaRPr lang="en-US" sz="4800" dirty="0">
               <a:solidFill>

</xml_diff>